<commit_message>
updated slides with new links
</commit_message>
<xml_diff>
--- a/AngularOAuthCodeCamp2015.pptx
+++ b/AngularOAuthCodeCamp2015.pptx
@@ -5,7 +5,7 @@
     <p:sldMasterId id="2147483732" r:id="rId1"/>
   </p:sldMasterIdLst>
   <p:notesMasterIdLst>
-    <p:notesMasterId r:id="rId20"/>
+    <p:notesMasterId r:id="rId21"/>
   </p:notesMasterIdLst>
   <p:sldIdLst>
     <p:sldId id="256" r:id="rId2"/>
@@ -25,7 +25,8 @@
     <p:sldId id="264" r:id="rId16"/>
     <p:sldId id="271" r:id="rId17"/>
     <p:sldId id="273" r:id="rId18"/>
-    <p:sldId id="265" r:id="rId19"/>
+    <p:sldId id="275" r:id="rId19"/>
+    <p:sldId id="265" r:id="rId20"/>
   </p:sldIdLst>
   <p:sldSz cx="9144000" cy="6858000" type="screen4x3"/>
   <p:notesSz cx="6858000" cy="9144000"/>
@@ -226,7 +227,7 @@
             <a:fld id="{2CDD9C06-9264-4EE0-B2F4-86190D484EC7}" type="datetimeFigureOut">
               <a:rPr lang="en-US" smtClean="0"/>
               <a:pPr/>
-              <a:t>6/27/2015</a:t>
+              <a:t>7/12/2015</a:t>
             </a:fld>
             <a:endParaRPr lang="en-US"/>
           </a:p>
@@ -1424,7 +1425,7 @@
             <a:fld id="{2F542E98-9E25-4A2D-9991-5E8BB5F8C050}" type="datetimeFigureOut">
               <a:rPr lang="en-US" smtClean="0"/>
               <a:pPr/>
-              <a:t>6/27/2015</a:t>
+              <a:t>7/12/2015</a:t>
             </a:fld>
             <a:endParaRPr lang="en-US"/>
           </a:p>
@@ -2295,7 +2296,7 @@
             <a:fld id="{2F542E98-9E25-4A2D-9991-5E8BB5F8C050}" type="datetimeFigureOut">
               <a:rPr lang="en-US" smtClean="0"/>
               <a:pPr/>
-              <a:t>6/27/2015</a:t>
+              <a:t>7/12/2015</a:t>
             </a:fld>
             <a:endParaRPr lang="en-US"/>
           </a:p>
@@ -2472,7 +2473,7 @@
             <a:fld id="{2F542E98-9E25-4A2D-9991-5E8BB5F8C050}" type="datetimeFigureOut">
               <a:rPr lang="en-US" smtClean="0"/>
               <a:pPr/>
-              <a:t>6/27/2015</a:t>
+              <a:t>7/12/2015</a:t>
             </a:fld>
             <a:endParaRPr lang="en-US"/>
           </a:p>
@@ -2644,7 +2645,7 @@
             <a:fld id="{2F542E98-9E25-4A2D-9991-5E8BB5F8C050}" type="datetimeFigureOut">
               <a:rPr lang="en-US" smtClean="0"/>
               <a:pPr/>
-              <a:t>6/27/2015</a:t>
+              <a:t>7/12/2015</a:t>
             </a:fld>
             <a:endParaRPr lang="en-US"/>
           </a:p>
@@ -2856,7 +2857,7 @@
             <a:fld id="{2F542E98-9E25-4A2D-9991-5E8BB5F8C050}" type="datetimeFigureOut">
               <a:rPr lang="en-US" smtClean="0"/>
               <a:pPr/>
-              <a:t>6/27/2015</a:t>
+              <a:t>7/12/2015</a:t>
             </a:fld>
             <a:endParaRPr lang="en-US"/>
           </a:p>
@@ -3672,7 +3673,7 @@
             <a:fld id="{2F542E98-9E25-4A2D-9991-5E8BB5F8C050}" type="datetimeFigureOut">
               <a:rPr lang="en-US" smtClean="0"/>
               <a:pPr/>
-              <a:t>6/27/2015</a:t>
+              <a:t>7/12/2015</a:t>
             </a:fld>
             <a:endParaRPr lang="en-US"/>
           </a:p>
@@ -3910,7 +3911,7 @@
             <a:fld id="{2F542E98-9E25-4A2D-9991-5E8BB5F8C050}" type="datetimeFigureOut">
               <a:rPr lang="en-US" smtClean="0"/>
               <a:pPr/>
-              <a:t>6/27/2015</a:t>
+              <a:t>7/12/2015</a:t>
             </a:fld>
             <a:endParaRPr lang="en-US"/>
           </a:p>
@@ -4235,7 +4236,7 @@
             <a:fld id="{2F542E98-9E25-4A2D-9991-5E8BB5F8C050}" type="datetimeFigureOut">
               <a:rPr lang="en-US" smtClean="0"/>
               <a:pPr/>
-              <a:t>6/27/2015</a:t>
+              <a:t>7/12/2015</a:t>
             </a:fld>
             <a:endParaRPr lang="en-US"/>
           </a:p>
@@ -4327,7 +4328,7 @@
             <a:fld id="{2F542E98-9E25-4A2D-9991-5E8BB5F8C050}" type="datetimeFigureOut">
               <a:rPr lang="en-US" smtClean="0"/>
               <a:pPr/>
-              <a:t>6/27/2015</a:t>
+              <a:t>7/12/2015</a:t>
             </a:fld>
             <a:endParaRPr lang="en-US"/>
           </a:p>
@@ -4846,7 +4847,7 @@
             <a:fld id="{2F542E98-9E25-4A2D-9991-5E8BB5F8C050}" type="datetimeFigureOut">
               <a:rPr lang="en-US" smtClean="0"/>
               <a:pPr/>
-              <a:t>6/27/2015</a:t>
+              <a:t>7/12/2015</a:t>
             </a:fld>
             <a:endParaRPr lang="en-US"/>
           </a:p>
@@ -5359,7 +5360,7 @@
             <a:fld id="{2F542E98-9E25-4A2D-9991-5E8BB5F8C050}" type="datetimeFigureOut">
               <a:rPr lang="en-US" smtClean="0"/>
               <a:pPr/>
-              <a:t>6/27/2015</a:t>
+              <a:t>7/12/2015</a:t>
             </a:fld>
             <a:endParaRPr lang="en-US"/>
           </a:p>
@@ -5606,7 +5607,7 @@
             <a:fld id="{2F542E98-9E25-4A2D-9991-5E8BB5F8C050}" type="datetimeFigureOut">
               <a:rPr lang="en-US" smtClean="0"/>
               <a:pPr/>
-              <a:t>6/27/2015</a:t>
+              <a:t>7/12/2015</a:t>
             </a:fld>
             <a:endParaRPr lang="en-US"/>
           </a:p>
@@ -6253,7 +6254,12 @@
             <p:ph type="subTitle" idx="1"/>
           </p:nvPr>
         </p:nvSpPr>
-        <p:spPr/>
+        <p:spPr>
+          <a:xfrm>
+            <a:off x="2286000" y="5003322"/>
+            <a:ext cx="6172200" cy="406878"/>
+          </a:xfrm>
+        </p:spPr>
         <p:txBody>
           <a:bodyPr/>
           <a:lstStyle/>
@@ -6300,6 +6306,36 @@
           <a:noFill/>
         </p:spPr>
       </p:pic>
+      <p:sp>
+        <p:nvSpPr>
+          <p:cNvPr id="5" name="TextBox 4"/>
+          <p:cNvSpPr txBox="1"/>
+          <p:nvPr/>
+        </p:nvSpPr>
+        <p:spPr>
+          <a:xfrm>
+            <a:off x="2362200" y="5867400"/>
+            <a:ext cx="6400800" cy="307777"/>
+          </a:xfrm>
+          <a:prstGeom prst="rect">
+            <a:avLst/>
+          </a:prstGeom>
+          <a:noFill/>
+        </p:spPr>
+        <p:txBody>
+          <a:bodyPr wrap="square" rtlCol="0">
+            <a:spAutoFit/>
+          </a:bodyPr>
+          <a:lstStyle/>
+          <a:p>
+            <a:r>
+              <a:rPr lang="en-US" sz="1400" dirty="0" smtClean="0"/>
+              <a:t>Source Code: https://github.com/szahn/AngularWebApiOAuthDemo</a:t>
+            </a:r>
+            <a:endParaRPr lang="en-US" sz="1400" dirty="0"/>
+          </a:p>
+        </p:txBody>
+      </p:sp>
     </p:spTree>
   </p:cSld>
   <p:clrMapOvr>
@@ -6361,7 +6397,7 @@
         <p:spPr/>
         <p:txBody>
           <a:bodyPr>
-            <a:normAutofit/>
+            <a:normAutofit lnSpcReduction="10000"/>
           </a:bodyPr>
           <a:lstStyle/>
           <a:p>
@@ -6471,7 +6507,7 @@
         <p:spPr/>
         <p:txBody>
           <a:bodyPr>
-            <a:normAutofit fontScale="92500" lnSpcReduction="20000"/>
+            <a:normAutofit fontScale="85000" lnSpcReduction="10000"/>
           </a:bodyPr>
           <a:lstStyle/>
           <a:p>
@@ -6899,7 +6935,7 @@
         <p:spPr/>
         <p:txBody>
           <a:bodyPr>
-            <a:normAutofit/>
+            <a:normAutofit lnSpcReduction="10000"/>
           </a:bodyPr>
           <a:lstStyle/>
           <a:p>
@@ -6917,19 +6953,7 @@
           <a:p>
             <a:r>
               <a:rPr lang="en-US" dirty="0" smtClean="0"/>
-              <a:t>Upon login, </a:t>
-            </a:r>
-            <a:r>
-              <a:rPr lang="en-US" dirty="0" smtClean="0"/>
-              <a:t>user/password and client id </a:t>
-            </a:r>
-            <a:r>
-              <a:rPr lang="en-US" dirty="0" smtClean="0"/>
-              <a:t>is sent to auth server and access token is returned.  Access token in HTML5 local storage</a:t>
-            </a:r>
-            <a:r>
-              <a:rPr lang="en-US" dirty="0" smtClean="0"/>
-              <a:t>.</a:t>
+              <a:t>Upon login, user/password and client id is sent to auth server and access token is returned.  Access token in HTML5 local storage.</a:t>
             </a:r>
           </a:p>
           <a:p>
@@ -6937,7 +6961,6 @@
               <a:rPr lang="en-US" dirty="0" smtClean="0"/>
               <a:t>Client id is used to validate the user.</a:t>
             </a:r>
-            <a:endParaRPr lang="en-US" dirty="0" smtClean="0"/>
           </a:p>
           <a:p>
             <a:r>
@@ -7169,9 +7192,18 @@
           <a:bodyPr/>
           <a:lstStyle/>
           <a:p>
+            <a:pPr>
+              <a:buNone/>
+            </a:pPr>
             <a:r>
               <a:rPr lang="en-US" b="1" dirty="0" smtClean="0"/>
-              <a:t>IdentityServer3</a:t>
+              <a:t>Client</a:t>
+            </a:r>
+          </a:p>
+          <a:p>
+            <a:r>
+              <a:rPr lang="en-US" dirty="0" err="1" smtClean="0"/>
+              <a:t>ngOAuth</a:t>
             </a:r>
             <a:r>
               <a:rPr lang="en-US" dirty="0" smtClean="0"/>
@@ -7181,18 +7213,52 @@
               <a:rPr lang="en-US" dirty="0" smtClean="0">
                 <a:hlinkClick r:id="rId2"/>
               </a:rPr>
+              <a:t>https://github.com/andreareginato/oauth-ng/</a:t>
+            </a:r>
+            <a:endParaRPr lang="en-US" dirty="0" smtClean="0"/>
+          </a:p>
+          <a:p>
+            <a:r>
+              <a:rPr lang="en-US" dirty="0" err="1" smtClean="0"/>
+              <a:t>Satellizer</a:t>
+            </a:r>
+            <a:r>
+              <a:rPr lang="en-US" dirty="0" smtClean="0"/>
+              <a:t>: https://github.com/sahat/satellizer</a:t>
+            </a:r>
+          </a:p>
+          <a:p>
+            <a:pPr>
+              <a:buNone/>
+            </a:pPr>
+            <a:endParaRPr lang="en-US" b="1" dirty="0" smtClean="0"/>
+          </a:p>
+          <a:p>
+            <a:pPr>
+              <a:buNone/>
+            </a:pPr>
+            <a:r>
+              <a:rPr lang="en-US" b="1" dirty="0" smtClean="0"/>
+              <a:t>Server</a:t>
+            </a:r>
+          </a:p>
+          <a:p>
+            <a:r>
+              <a:rPr lang="en-US" dirty="0" smtClean="0"/>
+              <a:t>IdentityServer3: </a:t>
+            </a:r>
+            <a:r>
+              <a:rPr lang="en-US" dirty="0" smtClean="0">
+                <a:hlinkClick r:id="rId3"/>
+              </a:rPr>
               <a:t>https://github.com/IdentityServer/IdentityServer3</a:t>
             </a:r>
             <a:endParaRPr lang="en-US" dirty="0" smtClean="0"/>
           </a:p>
           <a:p>
             <a:r>
-              <a:rPr lang="en-US" b="1" dirty="0" smtClean="0"/>
-              <a:t>Auth0</a:t>
-            </a:r>
-            <a:r>
               <a:rPr lang="en-US" dirty="0" smtClean="0"/>
-              <a:t>: https://auth0.com</a:t>
+              <a:t>Auth0: https://auth0.com</a:t>
             </a:r>
           </a:p>
           <a:p>
@@ -7297,11 +7363,7 @@
             </a:r>
             <a:r>
               <a:rPr lang="en-US" smtClean="0"/>
-              <a:t>disable </a:t>
-            </a:r>
-            <a:r>
-              <a:rPr lang="en-US" smtClean="0"/>
-              <a:t>client ids </a:t>
+              <a:t>disable client ids </a:t>
             </a:r>
             <a:r>
               <a:rPr lang="en-US" dirty="0" smtClean="0"/>
@@ -7374,8 +7436,157 @@
           <a:lstStyle/>
           <a:p>
             <a:r>
+              <a:rPr lang="en-US" dirty="0" err="1" smtClean="0"/>
+              <a:t>Pluralsight</a:t>
+            </a:r>
+            <a:r>
               <a:rPr lang="en-US" dirty="0" smtClean="0"/>
-              <a:t>Useful Links</a:t>
+              <a:t> Courses</a:t>
+            </a:r>
+            <a:endParaRPr lang="en-US" dirty="0"/>
+          </a:p>
+        </p:txBody>
+      </p:sp>
+      <p:sp>
+        <p:nvSpPr>
+          <p:cNvPr id="3" name="Content Placeholder 2"/>
+          <p:cNvSpPr>
+            <a:spLocks noGrp="1"/>
+          </p:cNvSpPr>
+          <p:nvPr>
+            <p:ph sz="quarter" idx="1"/>
+          </p:nvPr>
+        </p:nvSpPr>
+        <p:spPr/>
+        <p:txBody>
+          <a:bodyPr>
+            <a:normAutofit/>
+          </a:bodyPr>
+          <a:lstStyle/>
+          <a:p>
+            <a:r>
+              <a:rPr lang="en-US" sz="1600" b="1" dirty="0" smtClean="0"/>
+              <a:t>Creating Apps With Angular, Node, and Token Authentication</a:t>
+            </a:r>
+            <a:r>
+              <a:rPr lang="en-US" sz="1600" dirty="0" smtClean="0"/>
+              <a:t>: </a:t>
+            </a:r>
+            <a:r>
+              <a:rPr lang="en-US" sz="1600" dirty="0" smtClean="0">
+                <a:hlinkClick r:id="rId2"/>
+              </a:rPr>
+              <a:t>http://www.pluralsight.com/courses/creating-apps-angular-node-token-authentication</a:t>
+            </a:r>
+            <a:endParaRPr lang="en-US" sz="1600" dirty="0" smtClean="0"/>
+          </a:p>
+          <a:p>
+            <a:r>
+              <a:rPr lang="en-US" sz="1600" b="1" dirty="0" err="1" smtClean="0"/>
+              <a:t>AngularJS</a:t>
+            </a:r>
+            <a:r>
+              <a:rPr lang="en-US" sz="1600" b="1" dirty="0" smtClean="0"/>
+              <a:t> Security Fundamentals</a:t>
+            </a:r>
+            <a:r>
+              <a:rPr lang="en-US" sz="1600" dirty="0" smtClean="0"/>
+              <a:t>: </a:t>
+            </a:r>
+            <a:r>
+              <a:rPr lang="en-US" sz="1600" dirty="0" smtClean="0">
+                <a:hlinkClick r:id="rId3"/>
+              </a:rPr>
+              <a:t>http://www.pluralsight.com/courses/angularjs-security-fundamentals</a:t>
+            </a:r>
+            <a:endParaRPr lang="en-US" sz="1600" dirty="0" smtClean="0"/>
+          </a:p>
+          <a:p>
+            <a:r>
+              <a:rPr lang="en-US" sz="1600" b="1" dirty="0" smtClean="0"/>
+              <a:t>Implementing an API in ASP.NET Web API</a:t>
+            </a:r>
+            <a:r>
+              <a:rPr lang="en-US" sz="1600" dirty="0" smtClean="0"/>
+              <a:t>: </a:t>
+            </a:r>
+            <a:r>
+              <a:rPr lang="en-US" sz="1600" dirty="0" smtClean="0">
+                <a:hlinkClick r:id="rId4"/>
+              </a:rPr>
+              <a:t>http://www.pluralsight.com/courses/implementing-restful-aspdotnet-web-api</a:t>
+            </a:r>
+            <a:endParaRPr lang="en-US" sz="1600" dirty="0" smtClean="0"/>
+          </a:p>
+          <a:p>
+            <a:r>
+              <a:rPr lang="en-US" sz="1600" b="1" dirty="0" smtClean="0"/>
+              <a:t>Introduction to OAuth2, </a:t>
+            </a:r>
+            <a:r>
+              <a:rPr lang="en-US" sz="1600" b="1" dirty="0" err="1" smtClean="0"/>
+              <a:t>OpenID</a:t>
+            </a:r>
+            <a:r>
+              <a:rPr lang="en-US" sz="1600" b="1" dirty="0" smtClean="0"/>
+              <a:t> Connect and JSON Web Tokens (JWT): </a:t>
+            </a:r>
+            <a:r>
+              <a:rPr lang="en-US" sz="1600" dirty="0" smtClean="0">
+                <a:hlinkClick r:id="rId5"/>
+              </a:rPr>
+              <a:t>http://www.pluralsight.com/courses/oauth2-json-web-tokens-openid-connect-introduction</a:t>
+            </a:r>
+            <a:endParaRPr lang="en-US" sz="1600" dirty="0" smtClean="0"/>
+          </a:p>
+          <a:p>
+            <a:endParaRPr lang="en-US" sz="1600" dirty="0"/>
+          </a:p>
+        </p:txBody>
+      </p:sp>
+    </p:spTree>
+  </p:cSld>
+  <p:clrMapOvr>
+    <a:masterClrMapping/>
+  </p:clrMapOvr>
+</p:sld>
+</file>
+
+<file path=ppt/slides/slide19.xml><?xml version="1.0" encoding="utf-8"?>
+<p:sld xmlns:a="http://schemas.openxmlformats.org/drawingml/2006/main" xmlns:r="http://schemas.openxmlformats.org/officeDocument/2006/relationships" xmlns:p="http://schemas.openxmlformats.org/presentationml/2006/main">
+  <p:cSld>
+    <p:spTree>
+      <p:nvGrpSpPr>
+        <p:cNvPr id="1" name=""/>
+        <p:cNvGrpSpPr/>
+        <p:nvPr/>
+      </p:nvGrpSpPr>
+      <p:grpSpPr>
+        <a:xfrm>
+          <a:off x="0" y="0"/>
+          <a:ext cx="0" cy="0"/>
+          <a:chOff x="0" y="0"/>
+          <a:chExt cx="0" cy="0"/>
+        </a:xfrm>
+      </p:grpSpPr>
+      <p:sp>
+        <p:nvSpPr>
+          <p:cNvPr id="2" name="Title 1"/>
+          <p:cNvSpPr>
+            <a:spLocks noGrp="1"/>
+          </p:cNvSpPr>
+          <p:nvPr>
+            <p:ph type="title"/>
+          </p:nvPr>
+        </p:nvSpPr>
+        <p:spPr/>
+        <p:txBody>
+          <a:bodyPr/>
+          <a:lstStyle/>
+          <a:p>
+            <a:r>
+              <a:rPr lang="en-US" dirty="0" smtClean="0"/>
+              <a:t>Additional Reading</a:t>
             </a:r>
             <a:endParaRPr lang="en-US" dirty="0"/>
           </a:p>
@@ -7515,11 +7726,7 @@
             </a:r>
             <a:r>
               <a:rPr lang="en-US" sz="1600" dirty="0" smtClean="0"/>
-              <a:t>: http://</a:t>
-            </a:r>
-            <a:r>
-              <a:rPr lang="en-US" sz="1600" dirty="0" smtClean="0"/>
-              <a:t>oauth.net/documentation/getting-started</a:t>
+              <a:t>: http://oauth.net/documentation/getting-started</a:t>
             </a:r>
           </a:p>
           <a:p>
@@ -7529,13 +7736,8 @@
             </a:r>
             <a:r>
               <a:rPr lang="en-US" sz="1600" dirty="0" smtClean="0"/>
-              <a:t>: https</a:t>
-            </a:r>
-            <a:r>
-              <a:rPr lang="en-US" sz="1600" dirty="0" smtClean="0"/>
-              <a:t>://www.digitalocean.com/community/tutorials/an-introduction-to-oauth-2</a:t>
-            </a:r>
-            <a:endParaRPr lang="en-US" sz="1600" dirty="0" smtClean="0"/>
+              <a:t>: https://www.digitalocean.com/community/tutorials/an-introduction-to-oauth-2</a:t>
+            </a:r>
           </a:p>
         </p:txBody>
       </p:sp>
@@ -8239,7 +8441,7 @@
         <p:spPr/>
         <p:txBody>
           <a:bodyPr>
-            <a:normAutofit fontScale="85000" lnSpcReduction="10000"/>
+            <a:normAutofit fontScale="85000" lnSpcReduction="20000"/>
           </a:bodyPr>
           <a:lstStyle/>
           <a:p>

</xml_diff>